<commit_message>
#Anpassung der Grafik #13
</commit_message>
<xml_diff>
--- a/Dokumentation/Datenflussdiagramm.pptx
+++ b/Dokumentation/Datenflussdiagramm.pptx
@@ -104,6 +104,11 @@
       </a:defRPr>
     </a:lvl9pPr>
   </p:defaultTextStyle>
+  <p:extLst>
+    <p:ext uri="{EFAFB233-063F-42B5-8137-9DF3F51BA10A}">
+      <p15:sldGuideLst xmlns:p15="http://schemas.microsoft.com/office/powerpoint/2012/main"/>
+    </p:ext>
+  </p:extLst>
 </p:presentation>
 </file>
 
@@ -3771,7 +3776,7 @@
             <a:pPr algn="ctr"/>
             <a:r>
               <a:rPr lang="de-DE" sz="1050" dirty="0"/>
-              <a:t>Export</a:t>
+              <a:t>Import</a:t>
             </a:r>
           </a:p>
         </p:txBody>
@@ -3822,42 +3827,6 @@
           </a:p>
         </p:txBody>
       </p:sp>
-      <p:pic>
-        <p:nvPicPr>
-          <p:cNvPr id="20" name="Grafik 19" descr="Ein Bild, das Text, Visitenkarte enthält.&#10;&#10;Automatisch generierte Beschreibung">
-            <a:extLst>
-              <a:ext uri="{FF2B5EF4-FFF2-40B4-BE49-F238E27FC236}">
-                <a16:creationId xmlns:a16="http://schemas.microsoft.com/office/drawing/2014/main" id="{9157EA67-431B-F222-9336-3AF134E6F562}"/>
-              </a:ext>
-            </a:extLst>
-          </p:cNvPr>
-          <p:cNvPicPr>
-            <a:picLocks noChangeAspect="1"/>
-          </p:cNvPicPr>
-          <p:nvPr/>
-        </p:nvPicPr>
-        <p:blipFill>
-          <a:blip r:embed="rId4">
-            <a:extLst>
-              <a:ext uri="{28A0092B-C50C-407E-A947-70E740481C1C}">
-                <a14:useLocalDpi xmlns:a14="http://schemas.microsoft.com/office/drawing/2010/main" val="0"/>
-              </a:ext>
-            </a:extLst>
-          </a:blip>
-          <a:stretch>
-            <a:fillRect/>
-          </a:stretch>
-        </p:blipFill>
-        <p:spPr>
-          <a:xfrm>
-            <a:off x="3388622" y="630509"/>
-            <a:ext cx="700805" cy="667288"/>
-          </a:xfrm>
-          <a:prstGeom prst="rect">
-            <a:avLst/>
-          </a:prstGeom>
-        </p:spPr>
-      </p:pic>
       <p:sp>
         <p:nvSpPr>
           <p:cNvPr id="21" name="Rechteck 20">
@@ -3969,7 +3938,7 @@
           <p:nvPr/>
         </p:nvPicPr>
         <p:blipFill>
-          <a:blip r:embed="rId5">
+          <a:blip r:embed="rId4">
             <a:extLst>
               <a:ext uri="{28A0092B-C50C-407E-A947-70E740481C1C}">
                 <a14:useLocalDpi xmlns:a14="http://schemas.microsoft.com/office/drawing/2010/main" val="0"/>
@@ -4005,13 +3974,13 @@
           <p:nvPr/>
         </p:nvPicPr>
         <p:blipFill>
-          <a:blip r:embed="rId6">
+          <a:blip r:embed="rId5">
             <a:extLst>
               <a:ext uri="{28A0092B-C50C-407E-A947-70E740481C1C}">
                 <a14:useLocalDpi xmlns:a14="http://schemas.microsoft.com/office/drawing/2010/main" val="0"/>
               </a:ext>
               <a:ext uri="{96DAC541-7B7A-43D3-8B79-37D633B846F1}">
-                <asvg:svgBlip xmlns:asvg="http://schemas.microsoft.com/office/drawing/2016/SVG/main" r:embed="rId7"/>
+                <asvg:svgBlip xmlns:asvg="http://schemas.microsoft.com/office/drawing/2016/SVG/main" r:embed="rId6"/>
               </a:ext>
             </a:extLst>
           </a:blip>
@@ -4133,7 +4102,7 @@
         <p:spPr>
           <a:xfrm>
             <a:off x="6034492" y="3687055"/>
-            <a:ext cx="2143125" cy="511503"/>
+            <a:ext cx="2194029" cy="511503"/>
           </a:xfrm>
           <a:prstGeom prst="rect">
             <a:avLst/>
@@ -4179,45 +4148,27 @@
               <a:buChar char="•"/>
             </a:pPr>
             <a:r>
-              <a:rPr lang="de-DE" sz="1050" dirty="0" err="1">
-                <a:solidFill>
-                  <a:schemeClr val="tx1"/>
-                </a:solidFill>
-              </a:rPr>
-              <a:t>Pseudonomisieren</a:t>
-            </a:r>
-            <a:endParaRPr lang="de-DE" sz="1050" dirty="0">
-              <a:solidFill>
-                <a:schemeClr val="tx1"/>
-              </a:solidFill>
-            </a:endParaRPr>
-          </a:p>
-          <a:p>
-            <a:pPr marL="285750" indent="-285750">
-              <a:buFont typeface="Arial" panose="020B0604020202020204" pitchFamily="34" charset="0"/>
-              <a:buChar char="•"/>
-            </a:pPr>
-            <a:r>
               <a:rPr lang="de-DE" sz="1050" dirty="0">
                 <a:solidFill>
                   <a:schemeClr val="tx1"/>
                 </a:solidFill>
               </a:rPr>
-              <a:t>In Sternschema </a:t>
-            </a:r>
-            <a:r>
-              <a:rPr lang="de-DE" sz="1050" dirty="0" err="1">
+              <a:t>Pseudonymisieren</a:t>
+            </a:r>
+          </a:p>
+          <a:p>
+            <a:pPr marL="285750" indent="-285750">
+              <a:buFont typeface="Arial" panose="020B0604020202020204" pitchFamily="34" charset="0"/>
+              <a:buChar char="•"/>
+            </a:pPr>
+            <a:r>
+              <a:rPr lang="de-DE" sz="1050" dirty="0">
                 <a:solidFill>
                   <a:schemeClr val="tx1"/>
                 </a:solidFill>
               </a:rPr>
-              <a:t>transfomieren</a:t>
-            </a:r>
-            <a:endParaRPr lang="de-DE" sz="1050" dirty="0">
-              <a:solidFill>
-                <a:schemeClr val="tx1"/>
-              </a:solidFill>
-            </a:endParaRPr>
+              <a:t>In Sternschema transformieren</a:t>
+            </a:r>
           </a:p>
         </p:txBody>
       </p:sp>
@@ -4236,7 +4187,7 @@
         <p:spPr>
           <a:xfrm>
             <a:off x="6034492" y="3463934"/>
-            <a:ext cx="2143125" cy="223121"/>
+            <a:ext cx="2194029" cy="223121"/>
           </a:xfrm>
           <a:prstGeom prst="rect">
             <a:avLst/>
@@ -4285,13 +4236,13 @@
           <p:nvPr/>
         </p:nvPicPr>
         <p:blipFill>
-          <a:blip r:embed="rId6">
+          <a:blip r:embed="rId5">
             <a:extLst>
               <a:ext uri="{28A0092B-C50C-407E-A947-70E740481C1C}">
                 <a14:useLocalDpi xmlns:a14="http://schemas.microsoft.com/office/drawing/2010/main" val="0"/>
               </a:ext>
               <a:ext uri="{96DAC541-7B7A-43D3-8B79-37D633B846F1}">
-                <asvg:svgBlip xmlns:asvg="http://schemas.microsoft.com/office/drawing/2016/SVG/main" r:embed="rId7"/>
+                <asvg:svgBlip xmlns:asvg="http://schemas.microsoft.com/office/drawing/2016/SVG/main" r:embed="rId6"/>
               </a:ext>
             </a:extLst>
           </a:blip>
@@ -4451,7 +4402,7 @@
         </p:nvSpPr>
         <p:spPr>
           <a:xfrm rot="5400000">
-            <a:off x="6730555" y="3040363"/>
+            <a:off x="6751724" y="3030979"/>
             <a:ext cx="708658" cy="146737"/>
           </a:xfrm>
           <a:prstGeom prst="rightArrow">
@@ -4630,13 +4581,13 @@
           <p:nvPr/>
         </p:nvPicPr>
         <p:blipFill>
-          <a:blip r:embed="rId8">
+          <a:blip r:embed="rId7">
             <a:extLst>
               <a:ext uri="{28A0092B-C50C-407E-A947-70E740481C1C}">
                 <a14:useLocalDpi xmlns:a14="http://schemas.microsoft.com/office/drawing/2010/main" val="0"/>
               </a:ext>
               <a:ext uri="{96DAC541-7B7A-43D3-8B79-37D633B846F1}">
-                <asvg:svgBlip xmlns:asvg="http://schemas.microsoft.com/office/drawing/2016/SVG/main" r:embed="rId9"/>
+                <asvg:svgBlip xmlns:asvg="http://schemas.microsoft.com/office/drawing/2016/SVG/main" r:embed="rId8"/>
               </a:ext>
             </a:extLst>
           </a:blip>
@@ -4669,13 +4620,13 @@
           <p:nvPr/>
         </p:nvPicPr>
         <p:blipFill>
-          <a:blip r:embed="rId10">
+          <a:blip r:embed="rId9">
             <a:extLst>
               <a:ext uri="{28A0092B-C50C-407E-A947-70E740481C1C}">
                 <a14:useLocalDpi xmlns:a14="http://schemas.microsoft.com/office/drawing/2010/main" val="0"/>
               </a:ext>
               <a:ext uri="{96DAC541-7B7A-43D3-8B79-37D633B846F1}">
-                <asvg:svgBlip xmlns:asvg="http://schemas.microsoft.com/office/drawing/2016/SVG/main" r:embed="rId11"/>
+                <asvg:svgBlip xmlns:asvg="http://schemas.microsoft.com/office/drawing/2016/SVG/main" r:embed="rId10"/>
               </a:ext>
             </a:extLst>
           </a:blip>
@@ -4708,13 +4659,13 @@
           <p:nvPr/>
         </p:nvPicPr>
         <p:blipFill>
-          <a:blip r:embed="rId12">
+          <a:blip r:embed="rId11">
             <a:extLst>
               <a:ext uri="{28A0092B-C50C-407E-A947-70E740481C1C}">
                 <a14:useLocalDpi xmlns:a14="http://schemas.microsoft.com/office/drawing/2010/main" val="0"/>
               </a:ext>
               <a:ext uri="{96DAC541-7B7A-43D3-8B79-37D633B846F1}">
-                <asvg:svgBlip xmlns:asvg="http://schemas.microsoft.com/office/drawing/2016/SVG/main" r:embed="rId13"/>
+                <asvg:svgBlip xmlns:asvg="http://schemas.microsoft.com/office/drawing/2016/SVG/main" r:embed="rId12"/>
               </a:ext>
             </a:extLst>
           </a:blip>
@@ -4793,13 +4744,13 @@
           <p:nvPr/>
         </p:nvPicPr>
         <p:blipFill>
-          <a:blip r:embed="rId6">
+          <a:blip r:embed="rId5">
             <a:extLst>
               <a:ext uri="{28A0092B-C50C-407E-A947-70E740481C1C}">
                 <a14:useLocalDpi xmlns:a14="http://schemas.microsoft.com/office/drawing/2010/main" val="0"/>
               </a:ext>
               <a:ext uri="{96DAC541-7B7A-43D3-8B79-37D633B846F1}">
-                <asvg:svgBlip xmlns:asvg="http://schemas.microsoft.com/office/drawing/2016/SVG/main" r:embed="rId7"/>
+                <asvg:svgBlip xmlns:asvg="http://schemas.microsoft.com/office/drawing/2016/SVG/main" r:embed="rId6"/>
               </a:ext>
             </a:extLst>
           </a:blip>
@@ -4859,6 +4810,42 @@
             <a:extLst>
               <a:ext uri="{FF2B5EF4-FFF2-40B4-BE49-F238E27FC236}">
                 <a16:creationId xmlns:a16="http://schemas.microsoft.com/office/drawing/2014/main" id="{F44728A7-404E-DB30-AAF8-FD206A627CCA}"/>
+              </a:ext>
+            </a:extLst>
+          </p:cNvPr>
+          <p:cNvPicPr>
+            <a:picLocks noChangeAspect="1"/>
+          </p:cNvPicPr>
+          <p:nvPr/>
+        </p:nvPicPr>
+        <p:blipFill>
+          <a:blip r:embed="rId13">
+            <a:extLst>
+              <a:ext uri="{28A0092B-C50C-407E-A947-70E740481C1C}">
+                <a14:useLocalDpi xmlns:a14="http://schemas.microsoft.com/office/drawing/2010/main" val="0"/>
+              </a:ext>
+            </a:extLst>
+          </a:blip>
+          <a:stretch>
+            <a:fillRect/>
+          </a:stretch>
+        </p:blipFill>
+        <p:spPr>
+          <a:xfrm>
+            <a:off x="9131402" y="5641133"/>
+            <a:ext cx="1159412" cy="445189"/>
+          </a:xfrm>
+          <a:prstGeom prst="rect">
+            <a:avLst/>
+          </a:prstGeom>
+        </p:spPr>
+      </p:pic>
+      <p:pic>
+        <p:nvPicPr>
+          <p:cNvPr id="24" name="Grafik 23" descr="Ein Bild, das Visitenkarte, Vektorgrafiken enthält.&#10;&#10;Automatisch generierte Beschreibung">
+            <a:extLst>
+              <a:ext uri="{FF2B5EF4-FFF2-40B4-BE49-F238E27FC236}">
+                <a16:creationId xmlns:a16="http://schemas.microsoft.com/office/drawing/2014/main" id="{D8E1CDB3-3020-B79C-5D57-EB7F2F06B193}"/>
               </a:ext>
             </a:extLst>
           </p:cNvPr>
@@ -4881,8 +4868,8 @@
         </p:blipFill>
         <p:spPr>
           <a:xfrm>
-            <a:off x="9141562" y="5691933"/>
-            <a:ext cx="1159412" cy="445189"/>
+            <a:off x="3463206" y="655350"/>
+            <a:ext cx="636289" cy="636289"/>
           </a:xfrm>
           <a:prstGeom prst="rect">
             <a:avLst/>

</xml_diff>